<commit_message>
convertion between .Rmd, .R. and .mm
New Functions: r2rmd(), rmd2r(), r2mm(), mm2r().
</commit_message>
<xml_diff>
--- a/showcase/mindr.pptx
+++ b/showcase/mindr.pptx
@@ -288,7 +288,7 @@
           <a:p>
             <a:fld id="{0B1C3487-5DC4-40AB-B010-69D65F4C38F9}" type="datetimeFigureOut">
               <a:rPr lang="en-US" smtClean="0"/>
-              <a:t>10/27/2018</a:t>
+              <a:t>11/16/2018</a:t>
             </a:fld>
             <a:endParaRPr lang="en-US"/>
           </a:p>
@@ -458,7 +458,7 @@
           <a:p>
             <a:fld id="{0B1C3487-5DC4-40AB-B010-69D65F4C38F9}" type="datetimeFigureOut">
               <a:rPr lang="en-US" smtClean="0"/>
-              <a:t>10/27/2018</a:t>
+              <a:t>11/16/2018</a:t>
             </a:fld>
             <a:endParaRPr lang="en-US"/>
           </a:p>
@@ -638,7 +638,7 @@
           <a:p>
             <a:fld id="{0B1C3487-5DC4-40AB-B010-69D65F4C38F9}" type="datetimeFigureOut">
               <a:rPr lang="en-US" smtClean="0"/>
-              <a:t>10/27/2018</a:t>
+              <a:t>11/16/2018</a:t>
             </a:fld>
             <a:endParaRPr lang="en-US"/>
           </a:p>
@@ -808,7 +808,7 @@
           <a:p>
             <a:fld id="{0B1C3487-5DC4-40AB-B010-69D65F4C38F9}" type="datetimeFigureOut">
               <a:rPr lang="en-US" smtClean="0"/>
-              <a:t>10/27/2018</a:t>
+              <a:t>11/16/2018</a:t>
             </a:fld>
             <a:endParaRPr lang="en-US"/>
           </a:p>
@@ -1054,7 +1054,7 @@
           <a:p>
             <a:fld id="{0B1C3487-5DC4-40AB-B010-69D65F4C38F9}" type="datetimeFigureOut">
               <a:rPr lang="en-US" smtClean="0"/>
-              <a:t>10/27/2018</a:t>
+              <a:t>11/16/2018</a:t>
             </a:fld>
             <a:endParaRPr lang="en-US"/>
           </a:p>
@@ -1342,7 +1342,7 @@
           <a:p>
             <a:fld id="{0B1C3487-5DC4-40AB-B010-69D65F4C38F9}" type="datetimeFigureOut">
               <a:rPr lang="en-US" smtClean="0"/>
-              <a:t>10/27/2018</a:t>
+              <a:t>11/16/2018</a:t>
             </a:fld>
             <a:endParaRPr lang="en-US"/>
           </a:p>
@@ -1764,7 +1764,7 @@
           <a:p>
             <a:fld id="{0B1C3487-5DC4-40AB-B010-69D65F4C38F9}" type="datetimeFigureOut">
               <a:rPr lang="en-US" smtClean="0"/>
-              <a:t>10/27/2018</a:t>
+              <a:t>11/16/2018</a:t>
             </a:fld>
             <a:endParaRPr lang="en-US"/>
           </a:p>
@@ -1882,7 +1882,7 @@
           <a:p>
             <a:fld id="{0B1C3487-5DC4-40AB-B010-69D65F4C38F9}" type="datetimeFigureOut">
               <a:rPr lang="en-US" smtClean="0"/>
-              <a:t>10/27/2018</a:t>
+              <a:t>11/16/2018</a:t>
             </a:fld>
             <a:endParaRPr lang="en-US"/>
           </a:p>
@@ -1977,7 +1977,7 @@
           <a:p>
             <a:fld id="{0B1C3487-5DC4-40AB-B010-69D65F4C38F9}" type="datetimeFigureOut">
               <a:rPr lang="en-US" smtClean="0"/>
-              <a:t>10/27/2018</a:t>
+              <a:t>11/16/2018</a:t>
             </a:fld>
             <a:endParaRPr lang="en-US"/>
           </a:p>
@@ -2254,7 +2254,7 @@
           <a:p>
             <a:fld id="{0B1C3487-5DC4-40AB-B010-69D65F4C38F9}" type="datetimeFigureOut">
               <a:rPr lang="en-US" smtClean="0"/>
-              <a:t>10/27/2018</a:t>
+              <a:t>11/16/2018</a:t>
             </a:fld>
             <a:endParaRPr lang="en-US"/>
           </a:p>
@@ -2507,7 +2507,7 @@
           <a:p>
             <a:fld id="{0B1C3487-5DC4-40AB-B010-69D65F4C38F9}" type="datetimeFigureOut">
               <a:rPr lang="en-US" smtClean="0"/>
-              <a:t>10/27/2018</a:t>
+              <a:t>11/16/2018</a:t>
             </a:fld>
             <a:endParaRPr lang="en-US"/>
           </a:p>
@@ -2720,7 +2720,7 @@
           <a:p>
             <a:fld id="{0B1C3487-5DC4-40AB-B010-69D65F4C38F9}" type="datetimeFigureOut">
               <a:rPr lang="en-US" smtClean="0"/>
-              <a:t>10/27/2018</a:t>
+              <a:t>11/16/2018</a:t>
             </a:fld>
             <a:endParaRPr lang="en-US"/>
           </a:p>
@@ -3095,297 +3095,6 @@
           <a:chExt cx="0" cy="0"/>
         </a:xfrm>
       </p:grpSpPr>
-      <p:cxnSp>
-        <p:nvCxnSpPr>
-          <p:cNvPr id="47" name="Straight Arrow Connector 46"/>
-          <p:cNvCxnSpPr/>
-          <p:nvPr/>
-        </p:nvCxnSpPr>
-        <p:spPr>
-          <a:xfrm flipV="1">
-            <a:off x="3557524" y="948071"/>
-            <a:ext cx="294396" cy="132056"/>
-          </a:xfrm>
-          <a:prstGeom prst="straightConnector1">
-            <a:avLst/>
-          </a:prstGeom>
-          <a:ln w="76200">
-            <a:tailEnd type="arrow"/>
-          </a:ln>
-        </p:spPr>
-        <p:style>
-          <a:lnRef idx="1">
-            <a:schemeClr val="accent1"/>
-          </a:lnRef>
-          <a:fillRef idx="0">
-            <a:schemeClr val="accent1"/>
-          </a:fillRef>
-          <a:effectRef idx="0">
-            <a:schemeClr val="accent1"/>
-          </a:effectRef>
-          <a:fontRef idx="minor">
-            <a:schemeClr val="tx1"/>
-          </a:fontRef>
-        </p:style>
-      </p:cxnSp>
-      <p:cxnSp>
-        <p:nvCxnSpPr>
-          <p:cNvPr id="52" name="Straight Arrow Connector 51"/>
-          <p:cNvCxnSpPr>
-            <a:stCxn id="45" idx="6"/>
-          </p:cNvCxnSpPr>
-          <p:nvPr/>
-        </p:nvCxnSpPr>
-        <p:spPr>
-          <a:xfrm>
-            <a:off x="7105131" y="3543438"/>
-            <a:ext cx="14568" cy="461626"/>
-          </a:xfrm>
-          <a:prstGeom prst="straightConnector1">
-            <a:avLst/>
-          </a:prstGeom>
-          <a:ln w="76200">
-            <a:tailEnd type="arrow"/>
-          </a:ln>
-        </p:spPr>
-        <p:style>
-          <a:lnRef idx="1">
-            <a:schemeClr val="accent1"/>
-          </a:lnRef>
-          <a:fillRef idx="0">
-            <a:schemeClr val="accent1"/>
-          </a:fillRef>
-          <a:effectRef idx="0">
-            <a:schemeClr val="accent1"/>
-          </a:effectRef>
-          <a:fontRef idx="minor">
-            <a:schemeClr val="tx1"/>
-          </a:fontRef>
-        </p:style>
-      </p:cxnSp>
-      <p:cxnSp>
-        <p:nvCxnSpPr>
-          <p:cNvPr id="55" name="Straight Arrow Connector 54"/>
-          <p:cNvCxnSpPr/>
-          <p:nvPr/>
-        </p:nvCxnSpPr>
-        <p:spPr>
-          <a:xfrm flipH="1" flipV="1">
-            <a:off x="2494654" y="5283076"/>
-            <a:ext cx="113928" cy="140376"/>
-          </a:xfrm>
-          <a:prstGeom prst="straightConnector1">
-            <a:avLst/>
-          </a:prstGeom>
-          <a:ln w="76200">
-            <a:tailEnd type="arrow"/>
-          </a:ln>
-        </p:spPr>
-        <p:style>
-          <a:lnRef idx="1">
-            <a:schemeClr val="accent1"/>
-          </a:lnRef>
-          <a:fillRef idx="0">
-            <a:schemeClr val="accent1"/>
-          </a:fillRef>
-          <a:effectRef idx="0">
-            <a:schemeClr val="accent1"/>
-          </a:effectRef>
-          <a:fontRef idx="minor">
-            <a:schemeClr val="tx1"/>
-          </a:fontRef>
-        </p:style>
-      </p:cxnSp>
-      <p:cxnSp>
-        <p:nvCxnSpPr>
-          <p:cNvPr id="57" name="Straight Arrow Connector 56"/>
-          <p:cNvCxnSpPr/>
-          <p:nvPr/>
-        </p:nvCxnSpPr>
-        <p:spPr>
-          <a:xfrm flipV="1">
-            <a:off x="5628853" y="5013178"/>
-            <a:ext cx="455315" cy="358218"/>
-          </a:xfrm>
-          <a:prstGeom prst="straightConnector1">
-            <a:avLst/>
-          </a:prstGeom>
-          <a:ln w="76200">
-            <a:tailEnd type="arrow"/>
-          </a:ln>
-        </p:spPr>
-        <p:style>
-          <a:lnRef idx="1">
-            <a:schemeClr val="accent1"/>
-          </a:lnRef>
-          <a:fillRef idx="0">
-            <a:schemeClr val="accent1"/>
-          </a:fillRef>
-          <a:effectRef idx="0">
-            <a:schemeClr val="accent1"/>
-          </a:effectRef>
-          <a:fontRef idx="minor">
-            <a:schemeClr val="tx1"/>
-          </a:fontRef>
-        </p:style>
-      </p:cxnSp>
-      <p:cxnSp>
-        <p:nvCxnSpPr>
-          <p:cNvPr id="60" name="Straight Arrow Connector 59"/>
-          <p:cNvCxnSpPr/>
-          <p:nvPr/>
-        </p:nvCxnSpPr>
-        <p:spPr>
-          <a:xfrm flipH="1" flipV="1">
-            <a:off x="5163989" y="1450186"/>
-            <a:ext cx="344586" cy="140372"/>
-          </a:xfrm>
-          <a:prstGeom prst="straightConnector1">
-            <a:avLst/>
-          </a:prstGeom>
-          <a:ln w="76200">
-            <a:tailEnd type="arrow"/>
-          </a:ln>
-        </p:spPr>
-        <p:style>
-          <a:lnRef idx="1">
-            <a:schemeClr val="accent1"/>
-          </a:lnRef>
-          <a:fillRef idx="0">
-            <a:schemeClr val="accent1"/>
-          </a:fillRef>
-          <a:effectRef idx="0">
-            <a:schemeClr val="accent1"/>
-          </a:effectRef>
-          <a:fontRef idx="minor">
-            <a:schemeClr val="tx1"/>
-          </a:fontRef>
-        </p:style>
-      </p:cxnSp>
-      <p:cxnSp>
-        <p:nvCxnSpPr>
-          <p:cNvPr id="64" name="Straight Arrow Connector 63"/>
-          <p:cNvCxnSpPr/>
-          <p:nvPr/>
-        </p:nvCxnSpPr>
-        <p:spPr>
-          <a:xfrm>
-            <a:off x="2317824" y="3582572"/>
-            <a:ext cx="21928" cy="278476"/>
-          </a:xfrm>
-          <a:prstGeom prst="straightConnector1">
-            <a:avLst/>
-          </a:prstGeom>
-          <a:ln w="76200">
-            <a:tailEnd type="arrow"/>
-          </a:ln>
-        </p:spPr>
-        <p:style>
-          <a:lnRef idx="1">
-            <a:schemeClr val="accent1"/>
-          </a:lnRef>
-          <a:fillRef idx="0">
-            <a:schemeClr val="accent1"/>
-          </a:fillRef>
-          <a:effectRef idx="0">
-            <a:schemeClr val="accent1"/>
-          </a:effectRef>
-          <a:fontRef idx="minor">
-            <a:schemeClr val="tx1"/>
-          </a:fontRef>
-        </p:style>
-      </p:cxnSp>
-      <p:sp>
-        <p:nvSpPr>
-          <p:cNvPr id="45" name="Oval 44"/>
-          <p:cNvSpPr/>
-          <p:nvPr/>
-        </p:nvSpPr>
-        <p:spPr>
-          <a:xfrm>
-            <a:off x="1835696" y="908720"/>
-            <a:ext cx="5269435" cy="5269435"/>
-          </a:xfrm>
-          <a:prstGeom prst="ellipse">
-            <a:avLst/>
-          </a:prstGeom>
-          <a:noFill/>
-          <a:ln w="76200"/>
-        </p:spPr>
-        <p:style>
-          <a:lnRef idx="2">
-            <a:schemeClr val="accent1">
-              <a:shade val="50000"/>
-            </a:schemeClr>
-          </a:lnRef>
-          <a:fillRef idx="1">
-            <a:schemeClr val="accent1"/>
-          </a:fillRef>
-          <a:effectRef idx="0">
-            <a:schemeClr val="accent1"/>
-          </a:effectRef>
-          <a:fontRef idx="minor">
-            <a:schemeClr val="lt1"/>
-          </a:fontRef>
-        </p:style>
-        <p:txBody>
-          <a:bodyPr rtlCol="0" anchor="ctr"/>
-          <a:lstStyle/>
-          <a:p>
-            <a:pPr algn="ctr"/>
-            <a:endParaRPr lang="en-US"/>
-          </a:p>
-        </p:txBody>
-      </p:sp>
-      <p:sp>
-        <p:nvSpPr>
-          <p:cNvPr id="44" name="Oval 43"/>
-          <p:cNvSpPr/>
-          <p:nvPr/>
-        </p:nvSpPr>
-        <p:spPr>
-          <a:xfrm>
-            <a:off x="2317824" y="1340768"/>
-            <a:ext cx="4346875" cy="4346875"/>
-          </a:xfrm>
-          <a:prstGeom prst="ellipse">
-            <a:avLst/>
-          </a:prstGeom>
-          <a:noFill/>
-          <a:ln w="76200">
-            <a:solidFill>
-              <a:schemeClr val="tx2">
-                <a:lumMod val="60000"/>
-                <a:lumOff val="40000"/>
-              </a:schemeClr>
-            </a:solidFill>
-          </a:ln>
-        </p:spPr>
-        <p:style>
-          <a:lnRef idx="2">
-            <a:schemeClr val="accent1">
-              <a:shade val="50000"/>
-            </a:schemeClr>
-          </a:lnRef>
-          <a:fillRef idx="1">
-            <a:schemeClr val="accent1"/>
-          </a:fillRef>
-          <a:effectRef idx="0">
-            <a:schemeClr val="accent1"/>
-          </a:effectRef>
-          <a:fontRef idx="minor">
-            <a:schemeClr val="lt1"/>
-          </a:fontRef>
-        </p:style>
-        <p:txBody>
-          <a:bodyPr rtlCol="0" anchor="ctr"/>
-          <a:lstStyle/>
-          <a:p>
-            <a:pPr algn="ctr"/>
-            <a:endParaRPr lang="en-US"/>
-          </a:p>
-        </p:txBody>
-      </p:sp>
       <p:grpSp>
         <p:nvGrpSpPr>
           <p:cNvPr id="4" name="Group 6"/>
@@ -6437,7 +6146,7 @@
         </p:nvSpPr>
         <p:spPr>
           <a:xfrm>
-            <a:off x="1093101" y="2031231"/>
+            <a:off x="1048079" y="1865821"/>
             <a:ext cx="1390667" cy="461665"/>
           </a:xfrm>
           <a:prstGeom prst="rect">
@@ -6453,7 +6162,7 @@
           <a:p>
             <a:r>
               <a:rPr lang="de-AT" sz="2400" b="1" dirty="0" smtClean="0"/>
-              <a:t>md2r()</a:t>
+              <a:t>rmd2r()</a:t>
             </a:r>
             <a:endParaRPr lang="en-US" sz="2400" b="1" dirty="0"/>
           </a:p>
@@ -6483,7 +6192,7 @@
           <a:p>
             <a:r>
               <a:rPr lang="de-AT" sz="2400" b="1" dirty="0" smtClean="0"/>
-              <a:t>r2md()</a:t>
+              <a:t>r2rmd()</a:t>
             </a:r>
             <a:endParaRPr lang="en-US" sz="2400" b="1" dirty="0"/>
           </a:p>
@@ -6497,7 +6206,7 @@
         </p:nvSpPr>
         <p:spPr>
           <a:xfrm>
-            <a:off x="3923928" y="5085184"/>
+            <a:off x="3989908" y="5085184"/>
             <a:ext cx="1518196" cy="461665"/>
           </a:xfrm>
           <a:prstGeom prst="rect">
@@ -6527,7 +6236,7 @@
         </p:nvSpPr>
         <p:spPr>
           <a:xfrm>
-            <a:off x="3995936" y="6207695"/>
+            <a:off x="3989908" y="6207695"/>
             <a:ext cx="1518196" cy="461665"/>
           </a:xfrm>
           <a:prstGeom prst="rect">
@@ -6572,8 +6281,12 @@
           <a:lstStyle/>
           <a:p>
             <a:r>
+              <a:rPr lang="de-AT" sz="2400" b="1" dirty="0"/>
+              <a:t>r</a:t>
+            </a:r>
+            <a:r>
               <a:rPr lang="de-AT" sz="2400" b="1" dirty="0" smtClean="0"/>
-              <a:t>md2mm()</a:t>
+              <a:t>2mm()</a:t>
             </a:r>
             <a:endParaRPr lang="en-US" sz="2400" b="1" dirty="0"/>
           </a:p>
@@ -6587,7 +6300,7 @@
         </p:nvSpPr>
         <p:spPr>
           <a:xfrm>
-            <a:off x="5004048" y="2348880"/>
+            <a:off x="5286052" y="2348880"/>
             <a:ext cx="1518196" cy="461665"/>
           </a:xfrm>
           <a:prstGeom prst="rect">
@@ -6603,63 +6316,12 @@
           <a:p>
             <a:r>
               <a:rPr lang="de-AT" sz="2400" b="1" dirty="0" smtClean="0"/>
-              <a:t>mm2md()</a:t>
+              <a:t>mm2r()</a:t>
             </a:r>
             <a:endParaRPr lang="en-US" sz="2400" b="1" dirty="0"/>
           </a:p>
         </p:txBody>
       </p:sp>
-      <p:pic>
-        <p:nvPicPr>
-          <p:cNvPr id="1031" name="Picture 7" descr="Datei:Mindmap.jpg"/>
-          <p:cNvPicPr>
-            <a:picLocks noChangeAspect="1" noChangeArrowheads="1"/>
-          </p:cNvPicPr>
-          <p:nvPr/>
-        </p:nvPicPr>
-        <p:blipFill>
-          <a:blip r:embed="rId2" cstate="print">
-            <a:clrChange>
-              <a:clrFrom>
-                <a:srgbClr val="FFFFFF"/>
-              </a:clrFrom>
-              <a:clrTo>
-                <a:srgbClr val="FFFFFF">
-                  <a:alpha val="0"/>
-                </a:srgbClr>
-              </a:clrTo>
-            </a:clrChange>
-            <a:extLst>
-              <a:ext uri="{28A0092B-C50C-407E-A947-70E740481C1C}">
-                <a14:useLocalDpi xmlns:a14="http://schemas.microsoft.com/office/drawing/2010/main" val="0"/>
-              </a:ext>
-            </a:extLst>
-          </a:blip>
-          <a:srcRect/>
-          <a:stretch>
-            <a:fillRect/>
-          </a:stretch>
-        </p:blipFill>
-        <p:spPr bwMode="auto">
-          <a:xfrm>
-            <a:off x="6072534" y="3847402"/>
-            <a:ext cx="947738" cy="517702"/>
-          </a:xfrm>
-          <a:prstGeom prst="rect">
-            <a:avLst/>
-          </a:prstGeom>
-          <a:noFill/>
-          <a:extLst>
-            <a:ext uri="{909E8E84-426E-40DD-AFC4-6F175D3DCCD1}">
-              <a14:hiddenFill xmlns:a14="http://schemas.microsoft.com/office/drawing/2010/main">
-                <a:solidFill>
-                  <a:srgbClr val="FFFFFF"/>
-                </a:solidFill>
-              </a14:hiddenFill>
-            </a:ext>
-          </a:extLst>
-        </p:spPr>
-      </p:pic>
       <p:pic>
         <p:nvPicPr>
           <p:cNvPr id="1033" name="Picture 9" descr="âr logoâçå¾çæç´¢ç»æ"/>
@@ -6669,7 +6331,7 @@
           <p:nvPr/>
         </p:nvPicPr>
         <p:blipFill>
-          <a:blip r:embed="rId3" cstate="print">
+          <a:blip r:embed="rId2" cstate="print">
             <a:extLst>
               <a:ext uri="{28A0092B-C50C-407E-A947-70E740481C1C}">
                 <a14:useLocalDpi xmlns:a14="http://schemas.microsoft.com/office/drawing/2010/main" val="0"/>
@@ -6710,7 +6372,7 @@
           <p:nvPr/>
         </p:nvPicPr>
         <p:blipFill>
-          <a:blip r:embed="rId4" cstate="print">
+          <a:blip r:embed="rId3" cstate="print">
             <a:duotone>
               <a:schemeClr val="accent2">
                 <a:shade val="45000"/>
@@ -6733,6 +6395,334 @@
           <a:xfrm>
             <a:off x="2123728" y="3933897"/>
             <a:ext cx="631478" cy="388675"/>
+          </a:xfrm>
+          <a:prstGeom prst="rect">
+            <a:avLst/>
+          </a:prstGeom>
+          <a:noFill/>
+          <a:extLst>
+            <a:ext uri="{909E8E84-426E-40DD-AFC4-6F175D3DCCD1}">
+              <a14:hiddenFill xmlns:a14="http://schemas.microsoft.com/office/drawing/2010/main">
+                <a:solidFill>
+                  <a:srgbClr val="FFFFFF"/>
+                </a:solidFill>
+              </a14:hiddenFill>
+            </a:ext>
+          </a:extLst>
+        </p:spPr>
+      </p:pic>
+      <p:sp>
+        <p:nvSpPr>
+          <p:cNvPr id="24" name="Arc 23"/>
+          <p:cNvSpPr/>
+          <p:nvPr/>
+        </p:nvSpPr>
+        <p:spPr>
+          <a:xfrm>
+            <a:off x="1812255" y="871364"/>
+            <a:ext cx="5358011" cy="5358011"/>
+          </a:xfrm>
+          <a:prstGeom prst="arc">
+            <a:avLst>
+              <a:gd name="adj1" fmla="val 10052165"/>
+              <a:gd name="adj2" fmla="val 15326899"/>
+            </a:avLst>
+          </a:prstGeom>
+          <a:ln w="76200">
+            <a:solidFill>
+              <a:schemeClr val="accent6">
+                <a:lumMod val="75000"/>
+              </a:schemeClr>
+            </a:solidFill>
+            <a:headEnd type="none" w="med" len="med"/>
+            <a:tailEnd type="arrow" w="med" len="med"/>
+          </a:ln>
+        </p:spPr>
+        <p:style>
+          <a:lnRef idx="1">
+            <a:schemeClr val="accent1"/>
+          </a:lnRef>
+          <a:fillRef idx="0">
+            <a:schemeClr val="accent1"/>
+          </a:fillRef>
+          <a:effectRef idx="0">
+            <a:schemeClr val="accent1"/>
+          </a:effectRef>
+          <a:fontRef idx="minor">
+            <a:schemeClr val="tx1"/>
+          </a:fontRef>
+        </p:style>
+        <p:txBody>
+          <a:bodyPr rtlCol="0" anchor="ctr"/>
+          <a:lstStyle/>
+          <a:p>
+            <a:pPr algn="ctr"/>
+            <a:endParaRPr lang="en-US"/>
+          </a:p>
+        </p:txBody>
+      </p:sp>
+      <p:sp>
+        <p:nvSpPr>
+          <p:cNvPr id="53" name="Arc 52"/>
+          <p:cNvSpPr/>
+          <p:nvPr/>
+        </p:nvSpPr>
+        <p:spPr>
+          <a:xfrm>
+            <a:off x="2267744" y="1268760"/>
+            <a:ext cx="4436459" cy="4436459"/>
+          </a:xfrm>
+          <a:prstGeom prst="arc">
+            <a:avLst>
+              <a:gd name="adj1" fmla="val 17446918"/>
+              <a:gd name="adj2" fmla="val 359086"/>
+            </a:avLst>
+          </a:prstGeom>
+          <a:ln w="57150">
+            <a:headEnd type="arrow" w="med" len="med"/>
+            <a:tailEnd type="none" w="med" len="med"/>
+          </a:ln>
+        </p:spPr>
+        <p:style>
+          <a:lnRef idx="1">
+            <a:schemeClr val="accent1"/>
+          </a:lnRef>
+          <a:fillRef idx="0">
+            <a:schemeClr val="accent1"/>
+          </a:fillRef>
+          <a:effectRef idx="0">
+            <a:schemeClr val="accent1"/>
+          </a:effectRef>
+          <a:fontRef idx="minor">
+            <a:schemeClr val="tx1"/>
+          </a:fontRef>
+        </p:style>
+        <p:txBody>
+          <a:bodyPr rtlCol="0" anchor="ctr"/>
+          <a:lstStyle/>
+          <a:p>
+            <a:pPr algn="ctr"/>
+            <a:endParaRPr lang="en-US"/>
+          </a:p>
+        </p:txBody>
+      </p:sp>
+      <p:sp>
+        <p:nvSpPr>
+          <p:cNvPr id="54" name="Arc 53"/>
+          <p:cNvSpPr/>
+          <p:nvPr/>
+        </p:nvSpPr>
+        <p:spPr>
+          <a:xfrm>
+            <a:off x="2266291" y="1262219"/>
+            <a:ext cx="4436459" cy="4436459"/>
+          </a:xfrm>
+          <a:prstGeom prst="arc">
+            <a:avLst>
+              <a:gd name="adj1" fmla="val 2728104"/>
+              <a:gd name="adj2" fmla="val 7991355"/>
+            </a:avLst>
+          </a:prstGeom>
+          <a:ln w="57150">
+            <a:prstDash val="dash"/>
+            <a:headEnd type="arrow" w="med" len="med"/>
+            <a:tailEnd type="none" w="med" len="med"/>
+          </a:ln>
+        </p:spPr>
+        <p:style>
+          <a:lnRef idx="1">
+            <a:schemeClr val="accent1"/>
+          </a:lnRef>
+          <a:fillRef idx="0">
+            <a:schemeClr val="accent1"/>
+          </a:fillRef>
+          <a:effectRef idx="0">
+            <a:schemeClr val="accent1"/>
+          </a:effectRef>
+          <a:fontRef idx="minor">
+            <a:schemeClr val="tx1"/>
+          </a:fontRef>
+        </p:style>
+        <p:txBody>
+          <a:bodyPr rtlCol="0" anchor="ctr"/>
+          <a:lstStyle/>
+          <a:p>
+            <a:pPr algn="ctr"/>
+            <a:endParaRPr lang="en-US"/>
+          </a:p>
+        </p:txBody>
+      </p:sp>
+      <p:sp>
+        <p:nvSpPr>
+          <p:cNvPr id="56" name="Arc 55"/>
+          <p:cNvSpPr/>
+          <p:nvPr/>
+        </p:nvSpPr>
+        <p:spPr>
+          <a:xfrm>
+            <a:off x="2266292" y="1271473"/>
+            <a:ext cx="4436459" cy="4436459"/>
+          </a:xfrm>
+          <a:prstGeom prst="arc">
+            <a:avLst>
+              <a:gd name="adj1" fmla="val 10282897"/>
+              <a:gd name="adj2" fmla="val 15064530"/>
+            </a:avLst>
+          </a:prstGeom>
+          <a:ln w="57150">
+            <a:headEnd type="arrow" w="med" len="med"/>
+            <a:tailEnd type="none" w="med" len="med"/>
+          </a:ln>
+        </p:spPr>
+        <p:style>
+          <a:lnRef idx="1">
+            <a:schemeClr val="accent1"/>
+          </a:lnRef>
+          <a:fillRef idx="0">
+            <a:schemeClr val="accent1"/>
+          </a:fillRef>
+          <a:effectRef idx="0">
+            <a:schemeClr val="accent1"/>
+          </a:effectRef>
+          <a:fontRef idx="minor">
+            <a:schemeClr val="tx1"/>
+          </a:fontRef>
+        </p:style>
+        <p:txBody>
+          <a:bodyPr rtlCol="0" anchor="ctr"/>
+          <a:lstStyle/>
+          <a:p>
+            <a:pPr algn="ctr"/>
+            <a:endParaRPr lang="en-US"/>
+          </a:p>
+        </p:txBody>
+      </p:sp>
+      <p:sp>
+        <p:nvSpPr>
+          <p:cNvPr id="58" name="Arc 57"/>
+          <p:cNvSpPr/>
+          <p:nvPr/>
+        </p:nvSpPr>
+        <p:spPr>
+          <a:xfrm>
+            <a:off x="1787424" y="849684"/>
+            <a:ext cx="5358011" cy="5358011"/>
+          </a:xfrm>
+          <a:prstGeom prst="arc">
+            <a:avLst>
+              <a:gd name="adj1" fmla="val 17190406"/>
+              <a:gd name="adj2" fmla="val 604095"/>
+            </a:avLst>
+          </a:prstGeom>
+          <a:ln w="76200">
+            <a:solidFill>
+              <a:schemeClr val="accent6">
+                <a:lumMod val="75000"/>
+              </a:schemeClr>
+            </a:solidFill>
+            <a:prstDash val="sysDash"/>
+            <a:headEnd type="none" w="med" len="med"/>
+            <a:tailEnd type="arrow" w="med" len="med"/>
+          </a:ln>
+        </p:spPr>
+        <p:style>
+          <a:lnRef idx="1">
+            <a:schemeClr val="accent1"/>
+          </a:lnRef>
+          <a:fillRef idx="0">
+            <a:schemeClr val="accent1"/>
+          </a:fillRef>
+          <a:effectRef idx="0">
+            <a:schemeClr val="accent1"/>
+          </a:effectRef>
+          <a:fontRef idx="minor">
+            <a:schemeClr val="tx1"/>
+          </a:fontRef>
+        </p:style>
+        <p:txBody>
+          <a:bodyPr rtlCol="0" anchor="ctr"/>
+          <a:lstStyle/>
+          <a:p>
+            <a:pPr algn="ctr"/>
+            <a:endParaRPr lang="en-US"/>
+          </a:p>
+        </p:txBody>
+      </p:sp>
+      <p:sp>
+        <p:nvSpPr>
+          <p:cNvPr id="59" name="Arc 58"/>
+          <p:cNvSpPr/>
+          <p:nvPr/>
+        </p:nvSpPr>
+        <p:spPr>
+          <a:xfrm>
+            <a:off x="1805514" y="871364"/>
+            <a:ext cx="5358011" cy="5358011"/>
+          </a:xfrm>
+          <a:prstGeom prst="arc">
+            <a:avLst>
+              <a:gd name="adj1" fmla="val 2430561"/>
+              <a:gd name="adj2" fmla="val 8239300"/>
+            </a:avLst>
+          </a:prstGeom>
+          <a:ln w="76200">
+            <a:solidFill>
+              <a:schemeClr val="accent6">
+                <a:lumMod val="75000"/>
+              </a:schemeClr>
+            </a:solidFill>
+            <a:headEnd type="none" w="med" len="med"/>
+            <a:tailEnd type="arrow" w="med" len="med"/>
+          </a:ln>
+        </p:spPr>
+        <p:style>
+          <a:lnRef idx="1">
+            <a:schemeClr val="accent1"/>
+          </a:lnRef>
+          <a:fillRef idx="0">
+            <a:schemeClr val="accent1"/>
+          </a:fillRef>
+          <a:effectRef idx="0">
+            <a:schemeClr val="accent1"/>
+          </a:effectRef>
+          <a:fontRef idx="minor">
+            <a:schemeClr val="tx1"/>
+          </a:fontRef>
+        </p:style>
+        <p:txBody>
+          <a:bodyPr rtlCol="0" anchor="ctr"/>
+          <a:lstStyle/>
+          <a:p>
+            <a:pPr algn="ctr"/>
+            <a:endParaRPr lang="en-US"/>
+          </a:p>
+        </p:txBody>
+      </p:sp>
+      <p:pic>
+        <p:nvPicPr>
+          <p:cNvPr id="2" name="Picture 9" descr="C:\Users\PengZhao\AppData\Local\Microsoft\Windows\Temporary Internet Files\Content.IE5\QKHW6T1U\logiciels-mind-mapping-software-1342pmmd[1].png"/>
+          <p:cNvPicPr>
+            <a:picLocks noChangeAspect="1" noChangeArrowheads="1"/>
+          </p:cNvPicPr>
+          <p:nvPr/>
+        </p:nvPicPr>
+        <p:blipFill>
+          <a:blip r:embed="rId4">
+            <a:extLst>
+              <a:ext uri="{28A0092B-C50C-407E-A947-70E740481C1C}">
+                <a14:useLocalDpi xmlns:a14="http://schemas.microsoft.com/office/drawing/2010/main" val="0"/>
+              </a:ext>
+            </a:extLst>
+          </a:blip>
+          <a:srcRect/>
+          <a:stretch>
+            <a:fillRect/>
+          </a:stretch>
+        </p:blipFill>
+        <p:spPr bwMode="auto">
+          <a:xfrm>
+            <a:off x="6240405" y="3825044"/>
+            <a:ext cx="635851" cy="476888"/>
           </a:xfrm>
           <a:prstGeom prst="rect">
             <a:avLst/>

</xml_diff>